<commit_message>
Grammatical edits to slides
</commit_message>
<xml_diff>
--- a/reports/Capstone1_Final_Report_Pres.pptx
+++ b/reports/Capstone1_Final_Report_Pres.pptx
@@ -31,7 +31,6 @@
     <p:sldId id="282" r:id="rId25"/>
     <p:sldId id="283" r:id="rId26"/>
     <p:sldId id="284" r:id="rId27"/>
-    <p:sldId id="258" r:id="rId28"/>
   </p:sldIdLst>
   <p:sldSz cx="9144000" cy="5143500" type="screen16x9"/>
   <p:notesSz cx="6858000" cy="9144000"/>
@@ -322,7 +321,7 @@
             <a:fld id="{E637BB6B-EE1B-48FB-8575-0D55C373DE88}" type="datetimeFigureOut">
               <a:rPr lang="en-US" smtClean="0"/>
               <a:pPr eaLnBrk="1" latinLnBrk="0" hangingPunct="1"/>
-              <a:t>3/1/19</a:t>
+              <a:t>3/4/19</a:t>
             </a:fld>
             <a:endParaRPr lang="en-US"/>
           </a:p>
@@ -490,7 +489,7 @@
             <a:fld id="{E637BB6B-EE1B-48FB-8575-0D55C373DE88}" type="datetimeFigureOut">
               <a:rPr lang="en-US" smtClean="0"/>
               <a:pPr eaLnBrk="1" latinLnBrk="0" hangingPunct="1"/>
-              <a:t>3/1/19</a:t>
+              <a:t>3/4/19</a:t>
             </a:fld>
             <a:endParaRPr lang="en-US" dirty="0"/>
           </a:p>
@@ -668,7 +667,7 @@
             <a:fld id="{E637BB6B-EE1B-48FB-8575-0D55C373DE88}" type="datetimeFigureOut">
               <a:rPr lang="en-US" smtClean="0"/>
               <a:pPr eaLnBrk="1" latinLnBrk="0" hangingPunct="1"/>
-              <a:t>3/1/19</a:t>
+              <a:t>3/4/19</a:t>
             </a:fld>
             <a:endParaRPr lang="en-US"/>
           </a:p>
@@ -836,7 +835,7 @@
             <a:fld id="{E637BB6B-EE1B-48FB-8575-0D55C373DE88}" type="datetimeFigureOut">
               <a:rPr lang="en-US" smtClean="0"/>
               <a:pPr eaLnBrk="1" latinLnBrk="0" hangingPunct="1"/>
-              <a:t>3/1/19</a:t>
+              <a:t>3/4/19</a:t>
             </a:fld>
             <a:endParaRPr lang="en-US"/>
           </a:p>
@@ -1078,7 +1077,7 @@
             <a:fld id="{E637BB6B-EE1B-48FB-8575-0D55C373DE88}" type="datetimeFigureOut">
               <a:rPr lang="en-US" smtClean="0"/>
               <a:pPr eaLnBrk="1" latinLnBrk="0" hangingPunct="1"/>
-              <a:t>3/1/19</a:t>
+              <a:t>3/4/19</a:t>
             </a:fld>
             <a:endParaRPr lang="en-US"/>
           </a:p>
@@ -1171,7 +1170,7 @@
             <a:fld id="{E637BB6B-EE1B-48FB-8575-0D55C373DE88}" type="datetimeFigureOut">
               <a:rPr lang="en-US" smtClean="0"/>
               <a:pPr eaLnBrk="1" latinLnBrk="0" hangingPunct="1"/>
-              <a:t>3/1/19</a:t>
+              <a:t>3/4/19</a:t>
             </a:fld>
             <a:endParaRPr lang="en-US"/>
           </a:p>
@@ -1548,7 +1547,7 @@
             <a:fld id="{E637BB6B-EE1B-48FB-8575-0D55C373DE88}" type="datetimeFigureOut">
               <a:rPr lang="en-US" smtClean="0"/>
               <a:pPr eaLnBrk="1" latinLnBrk="0" hangingPunct="1"/>
-              <a:t>3/1/19</a:t>
+              <a:t>3/4/19</a:t>
             </a:fld>
             <a:endParaRPr lang="en-US"/>
           </a:p>
@@ -1806,7 +1805,7 @@
             <a:fld id="{E637BB6B-EE1B-48FB-8575-0D55C373DE88}" type="datetimeFigureOut">
               <a:rPr lang="en-US" smtClean="0"/>
               <a:pPr eaLnBrk="1" latinLnBrk="0" hangingPunct="1"/>
-              <a:t>3/1/19</a:t>
+              <a:t>3/4/19</a:t>
             </a:fld>
             <a:endParaRPr lang="en-US"/>
           </a:p>
@@ -1899,7 +1898,7 @@
             <a:fld id="{E637BB6B-EE1B-48FB-8575-0D55C373DE88}" type="datetimeFigureOut">
               <a:rPr lang="en-US" smtClean="0"/>
               <a:pPr eaLnBrk="1" latinLnBrk="0" hangingPunct="1"/>
-              <a:t>3/1/19</a:t>
+              <a:t>3/4/19</a:t>
             </a:fld>
             <a:endParaRPr lang="en-US"/>
           </a:p>
@@ -2176,7 +2175,7 @@
             <a:fld id="{E637BB6B-EE1B-48FB-8575-0D55C373DE88}" type="datetimeFigureOut">
               <a:rPr lang="en-US" smtClean="0"/>
               <a:pPr eaLnBrk="1" latinLnBrk="0" hangingPunct="1"/>
-              <a:t>3/1/19</a:t>
+              <a:t>3/4/19</a:t>
             </a:fld>
             <a:endParaRPr lang="en-US"/>
           </a:p>
@@ -2451,7 +2450,7 @@
             <a:fld id="{E637BB6B-EE1B-48FB-8575-0D55C373DE88}" type="datetimeFigureOut">
               <a:rPr lang="en-US" smtClean="0"/>
               <a:pPr eaLnBrk="1" latinLnBrk="0" hangingPunct="1"/>
-              <a:t>3/1/19</a:t>
+              <a:t>3/4/19</a:t>
             </a:fld>
             <a:endParaRPr lang="en-US"/>
           </a:p>
@@ -2754,7 +2753,7 @@
             <a:fld id="{E637BB6B-EE1B-48FB-8575-0D55C373DE88}" type="datetimeFigureOut">
               <a:rPr lang="en-US" smtClean="0"/>
               <a:pPr eaLnBrk="1" latinLnBrk="0" hangingPunct="1"/>
-              <a:t>3/1/19</a:t>
+              <a:t>3/4/19</a:t>
             </a:fld>
             <a:endParaRPr lang="en-US" sz="1000">
               <a:solidFill>
@@ -3305,6 +3304,13 @@
   <p:clrMapOvr>
     <a:masterClrMapping/>
   </p:clrMapOvr>
+  <p:timing>
+    <p:tnLst>
+      <p:par>
+        <p:cTn xmlns:p14="http://schemas.microsoft.com/office/powerpoint/2010/main" id="1" dur="indefinite" restart="never" nodeType="tmRoot"/>
+      </p:par>
+    </p:tnLst>
+  </p:timing>
 </p:sld>
 </file>
 
@@ -3499,6 +3505,13 @@
   <p:clrMapOvr>
     <a:masterClrMapping/>
   </p:clrMapOvr>
+  <p:timing>
+    <p:tnLst>
+      <p:par>
+        <p:cTn xmlns:p14="http://schemas.microsoft.com/office/powerpoint/2010/main" id="1" dur="indefinite" restart="never" nodeType="tmRoot"/>
+      </p:par>
+    </p:tnLst>
+  </p:timing>
 </p:sld>
 </file>
 
@@ -3681,6 +3694,13 @@
   <p:clrMapOvr>
     <a:masterClrMapping/>
   </p:clrMapOvr>
+  <p:timing>
+    <p:tnLst>
+      <p:par>
+        <p:cTn xmlns:p14="http://schemas.microsoft.com/office/powerpoint/2010/main" id="1" dur="indefinite" restart="never" nodeType="tmRoot"/>
+      </p:par>
+    </p:tnLst>
+  </p:timing>
 </p:sld>
 </file>
 
@@ -4633,6 +4653,13 @@
   <p:clrMapOvr>
     <a:masterClrMapping/>
   </p:clrMapOvr>
+  <p:timing>
+    <p:tnLst>
+      <p:par>
+        <p:cTn xmlns:p14="http://schemas.microsoft.com/office/powerpoint/2010/main" id="1" dur="indefinite" restart="never" nodeType="tmRoot"/>
+      </p:par>
+    </p:tnLst>
+  </p:timing>
 </p:sld>
 </file>
 
@@ -4846,6 +4873,13 @@
   <p:clrMapOvr>
     <a:masterClrMapping/>
   </p:clrMapOvr>
+  <p:timing>
+    <p:tnLst>
+      <p:par>
+        <p:cTn xmlns:p14="http://schemas.microsoft.com/office/powerpoint/2010/main" id="1" dur="indefinite" restart="never" nodeType="tmRoot"/>
+      </p:par>
+    </p:tnLst>
+  </p:timing>
 </p:sld>
 </file>
 
@@ -4893,7 +4927,6 @@
               <a:rPr lang="en-US" dirty="0"/>
               <a:t>Feature Importance</a:t>
             </a:r>
-            <a:endParaRPr lang="en-US" dirty="0"/>
           </a:p>
         </p:txBody>
       </p:sp>
@@ -4979,11 +5012,7 @@
             </a:r>
             <a:r>
               <a:rPr lang="en-US" dirty="0"/>
-              <a:t>project’s success is dependent upon providing actionable information that the client – coaching staff of a National 7s team – can use to inform their planning and preparation.</a:t>
-            </a:r>
-            <a:r>
-              <a:rPr lang="en-US" dirty="0"/>
-              <a:t> </a:t>
+              <a:t>project’s success is dependent upon providing actionable information that the client – coaching staff of a National 7s team – can use to inform their planning and preparation. </a:t>
             </a:r>
             <a:endParaRPr lang="en-US" dirty="0" smtClean="0"/>
           </a:p>
@@ -5005,6 +5034,13 @@
   <p:clrMapOvr>
     <a:masterClrMapping/>
   </p:clrMapOvr>
+  <p:timing>
+    <p:tnLst>
+      <p:par>
+        <p:cTn xmlns:p14="http://schemas.microsoft.com/office/powerpoint/2010/main" id="1" dur="indefinite" restart="never" nodeType="tmRoot"/>
+      </p:par>
+    </p:tnLst>
+  </p:timing>
 </p:sld>
 </file>
 
@@ -5049,7 +5085,6 @@
               <a:rPr lang="en-US" dirty="0"/>
               <a:t>Feature Importance</a:t>
             </a:r>
-            <a:endParaRPr lang="en-US" dirty="0"/>
           </a:p>
         </p:txBody>
       </p:sp>
@@ -5845,7 +5880,15 @@
             </a:r>
             <a:r>
               <a:rPr lang="en-US" sz="2000" dirty="0"/>
-              <a:t> algorithm, which provides us with the required method to extract the model’s feature importance</a:t>
+              <a:t> algorithm, which provides </a:t>
+            </a:r>
+            <a:r>
+              <a:rPr lang="en-US" sz="2000" dirty="0" smtClean="0"/>
+              <a:t>the </a:t>
+            </a:r>
+            <a:r>
+              <a:rPr lang="en-US" sz="2000" dirty="0"/>
+              <a:t>required method to extract the model’s feature importance</a:t>
             </a:r>
             <a:r>
               <a:rPr lang="en-US" sz="2000" dirty="0" smtClean="0"/>
@@ -5882,6 +5925,13 @@
   <p:clrMapOvr>
     <a:masterClrMapping/>
   </p:clrMapOvr>
+  <p:timing>
+    <p:tnLst>
+      <p:par>
+        <p:cTn xmlns:p14="http://schemas.microsoft.com/office/powerpoint/2010/main" id="1" dur="indefinite" restart="never" nodeType="tmRoot"/>
+      </p:par>
+    </p:tnLst>
+  </p:timing>
 </p:sld>
 </file>
 
@@ -6024,6 +6074,13 @@
   <p:clrMapOvr>
     <a:masterClrMapping/>
   </p:clrMapOvr>
+  <p:timing>
+    <p:tnLst>
+      <p:par>
+        <p:cTn xmlns:p14="http://schemas.microsoft.com/office/powerpoint/2010/main" id="1" dur="indefinite" restart="never" nodeType="tmRoot"/>
+      </p:par>
+    </p:tnLst>
+  </p:timing>
 </p:sld>
 </file>
 
@@ -6340,6 +6397,13 @@
   <p:clrMapOvr>
     <a:masterClrMapping/>
   </p:clrMapOvr>
+  <p:timing>
+    <p:tnLst>
+      <p:par>
+        <p:cTn xmlns:p14="http://schemas.microsoft.com/office/powerpoint/2010/main" id="1" dur="indefinite" restart="never" nodeType="tmRoot"/>
+      </p:par>
+    </p:tnLst>
+  </p:timing>
 </p:sld>
 </file>
 
@@ -6678,6 +6742,13 @@
   <p:clrMapOvr>
     <a:masterClrMapping/>
   </p:clrMapOvr>
+  <p:timing>
+    <p:tnLst>
+      <p:par>
+        <p:cTn xmlns:p14="http://schemas.microsoft.com/office/powerpoint/2010/main" id="1" dur="indefinite" restart="never" nodeType="tmRoot"/>
+      </p:par>
+    </p:tnLst>
+  </p:timing>
 </p:sld>
 </file>
 
@@ -6888,6 +6959,13 @@
   <p:clrMapOvr>
     <a:masterClrMapping/>
   </p:clrMapOvr>
+  <p:timing>
+    <p:tnLst>
+      <p:par>
+        <p:cTn xmlns:p14="http://schemas.microsoft.com/office/powerpoint/2010/main" id="1" dur="indefinite" restart="never" nodeType="tmRoot"/>
+      </p:par>
+    </p:tnLst>
+  </p:timing>
 </p:sld>
 </file>
 
@@ -7062,6 +7140,13 @@
   <p:clrMapOvr>
     <a:masterClrMapping/>
   </p:clrMapOvr>
+  <p:timing>
+    <p:tnLst>
+      <p:par>
+        <p:cTn xmlns:p14="http://schemas.microsoft.com/office/powerpoint/2010/main" id="1" dur="indefinite" restart="never" nodeType="tmRoot"/>
+      </p:par>
+    </p:tnLst>
+  </p:timing>
 </p:sld>
 </file>
 
@@ -7292,6 +7377,13 @@
   <p:clrMapOvr>
     <a:masterClrMapping/>
   </p:clrMapOvr>
+  <p:timing>
+    <p:tnLst>
+      <p:par>
+        <p:cTn xmlns:p14="http://schemas.microsoft.com/office/powerpoint/2010/main" id="1" dur="indefinite" restart="never" nodeType="tmRoot"/>
+      </p:par>
+    </p:tnLst>
+  </p:timing>
 </p:sld>
 </file>
 
@@ -7470,6 +7562,13 @@
   <p:clrMapOvr>
     <a:masterClrMapping/>
   </p:clrMapOvr>
+  <p:timing>
+    <p:tnLst>
+      <p:par>
+        <p:cTn xmlns:p14="http://schemas.microsoft.com/office/powerpoint/2010/main" id="1" dur="indefinite" restart="never" nodeType="tmRoot"/>
+      </p:par>
+    </p:tnLst>
+  </p:timing>
 </p:sld>
 </file>
 
@@ -7681,6 +7780,13 @@
   <p:clrMapOvr>
     <a:masterClrMapping/>
   </p:clrMapOvr>
+  <p:timing>
+    <p:tnLst>
+      <p:par>
+        <p:cTn xmlns:p14="http://schemas.microsoft.com/office/powerpoint/2010/main" id="1" dur="indefinite" restart="never" nodeType="tmRoot"/>
+      </p:par>
+    </p:tnLst>
+  </p:timing>
 </p:sld>
 </file>
 
@@ -7977,6 +8083,13 @@
   <p:clrMapOvr>
     <a:masterClrMapping/>
   </p:clrMapOvr>
+  <p:timing>
+    <p:tnLst>
+      <p:par>
+        <p:cTn xmlns:p14="http://schemas.microsoft.com/office/powerpoint/2010/main" id="1" dur="indefinite" restart="never" nodeType="tmRoot"/>
+      </p:par>
+    </p:tnLst>
+  </p:timing>
 </p:sld>
 </file>
 
@@ -8199,6 +8312,13 @@
   <p:clrMapOvr>
     <a:masterClrMapping/>
   </p:clrMapOvr>
+  <p:timing>
+    <p:tnLst>
+      <p:par>
+        <p:cTn xmlns:p14="http://schemas.microsoft.com/office/powerpoint/2010/main" id="1" dur="indefinite" restart="never" nodeType="tmRoot"/>
+      </p:par>
+    </p:tnLst>
+  </p:timing>
 </p:sld>
 </file>
 
@@ -8331,7 +8451,15 @@
             </a:r>
             <a:r>
               <a:rPr lang="en-US" sz="1900" dirty="0"/>
-              <a:t>, data and statistics can be used to analyze how a team matches up against opponents </a:t>
+              <a:t>, data and statistics can be used to analyze how a team </a:t>
+            </a:r>
+            <a:r>
+              <a:rPr lang="en-US" sz="1900" dirty="0" smtClean="0"/>
+              <a:t>potentially matches </a:t>
+            </a:r>
+            <a:r>
+              <a:rPr lang="en-US" sz="1900" dirty="0"/>
+              <a:t>up against opponents </a:t>
             </a:r>
             <a:endParaRPr lang="en-US" sz="1900" dirty="0" smtClean="0"/>
           </a:p>
@@ -8355,7 +8483,15 @@
             </a:r>
             <a:r>
               <a:rPr lang="en-US" sz="1900" dirty="0"/>
-              <a:t>video analysis inquiry into tactics and technique, can provide a tactical </a:t>
+              <a:t>video analysis inquiry into tactics and </a:t>
+            </a:r>
+            <a:r>
+              <a:rPr lang="en-US" sz="1900" dirty="0" smtClean="0"/>
+              <a:t>technique </a:t>
+            </a:r>
+            <a:r>
+              <a:rPr lang="en-US" sz="1900" dirty="0"/>
+              <a:t>can provide a tactical </a:t>
             </a:r>
             <a:r>
               <a:rPr lang="en-US" sz="1900" dirty="0" smtClean="0"/>
@@ -8402,6 +8538,13 @@
   <p:clrMapOvr>
     <a:masterClrMapping/>
   </p:clrMapOvr>
+  <p:timing>
+    <p:tnLst>
+      <p:par>
+        <p:cTn xmlns:p14="http://schemas.microsoft.com/office/powerpoint/2010/main" id="1" dur="indefinite" restart="never" nodeType="tmRoot"/>
+      </p:par>
+    </p:tnLst>
+  </p:timing>
 </p:sld>
 </file>
 
@@ -8634,36 +8777,13 @@
   <p:clrMapOvr>
     <a:masterClrMapping/>
   </p:clrMapOvr>
-</p:sld>
-</file>
-
-<file path=ppt/slides/slide27.xml><?xml version="1.0" encoding="utf-8"?>
-<p:sld xmlns:a="http://schemas.openxmlformats.org/drawingml/2006/main" xmlns:r="http://schemas.openxmlformats.org/officeDocument/2006/relationships" xmlns:p="http://schemas.openxmlformats.org/presentationml/2006/main">
-  <p:cSld>
-    <p:spTree>
-      <p:nvGrpSpPr>
-        <p:cNvPr id="1" name=""/>
-        <p:cNvGrpSpPr/>
-        <p:nvPr/>
-      </p:nvGrpSpPr>
-      <p:grpSpPr>
-        <a:xfrm>
-          <a:off x="0" y="0"/>
-          <a:ext cx="0" cy="0"/>
-          <a:chOff x="0" y="0"/>
-          <a:chExt cx="0" cy="0"/>
-        </a:xfrm>
-      </p:grpSpPr>
-    </p:spTree>
-    <p:extLst>
-      <p:ext uri="{BB962C8B-B14F-4D97-AF65-F5344CB8AC3E}">
-        <p14:creationId xmlns:p14="http://schemas.microsoft.com/office/powerpoint/2010/main" val="3248322793"/>
-      </p:ext>
-    </p:extLst>
-  </p:cSld>
-  <p:clrMapOvr>
-    <a:masterClrMapping/>
-  </p:clrMapOvr>
+  <p:timing>
+    <p:tnLst>
+      <p:par>
+        <p:cTn xmlns:p14="http://schemas.microsoft.com/office/powerpoint/2010/main" id="1" dur="indefinite" restart="never" nodeType="tmRoot"/>
+      </p:par>
+    </p:tnLst>
+  </p:timing>
 </p:sld>
 </file>
 
@@ -8743,7 +8863,15 @@
             </a:r>
             <a:r>
               <a:rPr lang="en-US" dirty="0"/>
-              <a:t>client for this project is the coaching staff of an International Men’s Rugby 7s team (“the team”), and as such, the project will focus on identifying the most important variables for the this particular team.  </a:t>
+              <a:t>client for this project is the coaching staff of an International Men’s Rugby 7s team (“the team”), and as such, the project will focus on identifying the most important variables </a:t>
+            </a:r>
+            <a:r>
+              <a:rPr lang="en-US" dirty="0" smtClean="0"/>
+              <a:t>for </a:t>
+            </a:r>
+            <a:r>
+              <a:rPr lang="en-US" dirty="0"/>
+              <a:t>this particular team.  </a:t>
             </a:r>
           </a:p>
           <a:p>
@@ -8773,16 +8901,20 @@
               <a:t>to </a:t>
             </a:r>
             <a:r>
-              <a:rPr lang="en-US" dirty="0"/>
-              <a:t>either </a:t>
-            </a:r>
-            <a:r>
               <a:rPr lang="en-US" dirty="0" smtClean="0"/>
               <a:t>improve </a:t>
             </a:r>
             <a:r>
               <a:rPr lang="en-US" dirty="0"/>
-              <a:t>in these areas by allocating more </a:t>
+              <a:t>in these areas by </a:t>
+            </a:r>
+            <a:r>
+              <a:rPr lang="en-US" dirty="0"/>
+              <a:t>either allocating </a:t>
+            </a:r>
+            <a:r>
+              <a:rPr lang="en-US" dirty="0"/>
+              <a:t>more </a:t>
             </a:r>
             <a:r>
               <a:rPr lang="en-US" dirty="0" smtClean="0"/>
@@ -8816,6 +8948,13 @@
   <p:clrMapOvr>
     <a:masterClrMapping/>
   </p:clrMapOvr>
+  <p:timing>
+    <p:tnLst>
+      <p:par>
+        <p:cTn xmlns:p14="http://schemas.microsoft.com/office/powerpoint/2010/main" id="1" dur="indefinite" restart="never" nodeType="tmRoot"/>
+      </p:par>
+    </p:tnLst>
+  </p:timing>
 </p:sld>
 </file>
 
@@ -8968,6 +9107,13 @@
   <p:clrMapOvr>
     <a:masterClrMapping/>
   </p:clrMapOvr>
+  <p:timing>
+    <p:tnLst>
+      <p:par>
+        <p:cTn xmlns:p14="http://schemas.microsoft.com/office/powerpoint/2010/main" id="1" dur="indefinite" restart="never" nodeType="tmRoot"/>
+      </p:par>
+    </p:tnLst>
+  </p:timing>
 </p:sld>
 </file>
 
@@ -9167,6 +9313,13 @@
   <p:clrMapOvr>
     <a:masterClrMapping/>
   </p:clrMapOvr>
+  <p:timing>
+    <p:tnLst>
+      <p:par>
+        <p:cTn xmlns:p14="http://schemas.microsoft.com/office/powerpoint/2010/main" id="1" dur="indefinite" restart="never" nodeType="tmRoot"/>
+      </p:par>
+    </p:tnLst>
+  </p:timing>
 </p:sld>
 </file>
 
@@ -9212,11 +9365,7 @@
             <a:pPr marL="45720" indent="0"/>
             <a:r>
               <a:rPr lang="en-US" dirty="0" smtClean="0"/>
-              <a:t>Data </a:t>
-            </a:r>
-            <a:r>
-              <a:rPr lang="en-US" dirty="0" smtClean="0"/>
-              <a:t>Wrangling</a:t>
+              <a:t>Data Wrangling</a:t>
             </a:r>
             <a:endParaRPr lang="en-US" dirty="0"/>
           </a:p>
@@ -9316,6 +9465,13 @@
   <p:clrMapOvr>
     <a:masterClrMapping/>
   </p:clrMapOvr>
+  <p:timing>
+    <p:tnLst>
+      <p:par>
+        <p:cTn xmlns:p14="http://schemas.microsoft.com/office/powerpoint/2010/main" id="1" dur="indefinite" restart="never" nodeType="tmRoot"/>
+      </p:par>
+    </p:tnLst>
+  </p:timing>
 </p:sld>
 </file>
 
@@ -9385,7 +9541,7 @@
         </p:spPr>
         <p:txBody>
           <a:bodyPr>
-            <a:normAutofit fontScale="92500" lnSpcReduction="10000"/>
+            <a:normAutofit fontScale="92500" lnSpcReduction="20000"/>
           </a:bodyPr>
           <a:lstStyle/>
           <a:p>
@@ -9523,8 +9679,37 @@
             </a:r>
             <a:r>
               <a:rPr lang="en-US" dirty="0" smtClean="0"/>
-              <a:t> differential between the US and their opponent. Represents both teams’ results in one data point</a:t>
-            </a:r>
+              <a:t> differential </a:t>
+            </a:r>
+            <a:r>
+              <a:rPr lang="en-US" dirty="0" smtClean="0"/>
+              <a:t>in </a:t>
+            </a:r>
+            <a:r>
+              <a:rPr lang="en-US" dirty="0" smtClean="0"/>
+              <a:t>the </a:t>
+            </a:r>
+            <a:r>
+              <a:rPr lang="en-US" dirty="0" smtClean="0"/>
+              <a:t>total points of the US </a:t>
+            </a:r>
+            <a:r>
+              <a:rPr lang="en-US" dirty="0" smtClean="0"/>
+              <a:t>and their opponent. Represents both teams’ </a:t>
+            </a:r>
+            <a:r>
+              <a:rPr lang="en-US" dirty="0" smtClean="0"/>
+              <a:t>performance </a:t>
+            </a:r>
+            <a:r>
+              <a:rPr lang="en-US" dirty="0" smtClean="0"/>
+              <a:t>in one data </a:t>
+            </a:r>
+            <a:r>
+              <a:rPr lang="en-US" dirty="0" smtClean="0"/>
+              <a:t>point.</a:t>
+            </a:r>
+            <a:endParaRPr lang="en-US" dirty="0" smtClean="0"/>
           </a:p>
           <a:p>
             <a:pPr marL="677545" lvl="1" indent="-182563">
@@ -9577,6 +9762,13 @@
   <p:clrMapOvr>
     <a:masterClrMapping/>
   </p:clrMapOvr>
+  <p:timing>
+    <p:tnLst>
+      <p:par>
+        <p:cTn xmlns:p14="http://schemas.microsoft.com/office/powerpoint/2010/main" id="1" dur="indefinite" restart="never" nodeType="tmRoot"/>
+      </p:par>
+    </p:tnLst>
+  </p:timing>
 </p:sld>
 </file>
 
@@ -9622,7 +9814,7 @@
             <a:pPr marL="45720" indent="0"/>
             <a:r>
               <a:rPr lang="en-US" sz="3300" dirty="0" smtClean="0"/>
-              <a:t>EDA</a:t>
+              <a:t>Exploratory Data Analysis (EDA)</a:t>
             </a:r>
             <a:endParaRPr lang="en-US" sz="3300" dirty="0"/>
           </a:p>
@@ -9640,13 +9832,13 @@
         </p:nvSpPr>
         <p:spPr>
           <a:xfrm>
-            <a:off x="914400" y="1142656"/>
-            <a:ext cx="4673286" cy="3761062"/>
+            <a:off x="914400" y="1518976"/>
+            <a:ext cx="4673286" cy="3338413"/>
           </a:xfrm>
         </p:spPr>
         <p:txBody>
           <a:bodyPr>
-            <a:normAutofit lnSpcReduction="10000"/>
+            <a:normAutofit/>
           </a:bodyPr>
           <a:lstStyle/>
           <a:p>
@@ -9664,11 +9856,19 @@
             </a:pPr>
             <a:r>
               <a:rPr lang="en-US" dirty="0" smtClean="0"/>
-              <a:t>Explored </a:t>
-            </a:r>
-            <a:r>
-              <a:rPr lang="en-US" dirty="0"/>
-              <a:t>the correlations between variables. </a:t>
+              <a:t>Analysis </a:t>
+            </a:r>
+            <a:r>
+              <a:rPr lang="en-US" dirty="0"/>
+              <a:t>of </a:t>
+            </a:r>
+            <a:r>
+              <a:rPr lang="en-US" dirty="0" smtClean="0"/>
+              <a:t>correlations </a:t>
+            </a:r>
+            <a:r>
+              <a:rPr lang="en-US" dirty="0"/>
+              <a:t>revealed that the strongest positive correlation is between the Possession Time Difference and Passes Difference (r=0.89). </a:t>
             </a:r>
             <a:endParaRPr lang="en-US" dirty="0" smtClean="0"/>
           </a:p>
@@ -9686,37 +9886,6 @@
               <a:buNone/>
             </a:pPr>
             <a:r>
-              <a:rPr lang="en-US" dirty="0" smtClean="0"/>
-              <a:t>Analysis </a:t>
-            </a:r>
-            <a:r>
-              <a:rPr lang="en-US" dirty="0"/>
-              <a:t>of </a:t>
-            </a:r>
-            <a:r>
-              <a:rPr lang="en-US" dirty="0" smtClean="0"/>
-              <a:t>correlations </a:t>
-            </a:r>
-            <a:r>
-              <a:rPr lang="en-US" dirty="0"/>
-              <a:t>revealed that the strongest positive correlation is between the Possession Time Difference and Passes Difference (r=0.89). </a:t>
-            </a:r>
-            <a:endParaRPr lang="en-US" dirty="0" smtClean="0"/>
-          </a:p>
-          <a:p>
-            <a:pPr marL="45720" indent="0">
-              <a:lnSpc>
-                <a:spcPct val="110000"/>
-              </a:lnSpc>
-              <a:spcBef>
-                <a:spcPts val="0"/>
-              </a:spcBef>
-              <a:spcAft>
-                <a:spcPts val="1200"/>
-              </a:spcAft>
-              <a:buNone/>
-            </a:pPr>
-            <a:r>
               <a:rPr lang="en-US" dirty="0"/>
               <a:t>Makes intuitive sense, as typically the more time a team has possession of the ball, the more passes they will make</a:t>
             </a:r>
@@ -9736,7 +9905,7 @@
         </p:nvGrpSpPr>
         <p:grpSpPr>
           <a:xfrm>
-            <a:off x="5587686" y="1215801"/>
+            <a:off x="5587686" y="1650921"/>
             <a:ext cx="3248925" cy="3206625"/>
             <a:chOff x="4493243" y="1499484"/>
             <a:chExt cx="3640761" cy="3593359"/>
@@ -9814,6 +9983,44 @@
           </p:spPr>
         </p:pic>
       </p:grpSp>
+      <p:sp>
+        <p:nvSpPr>
+          <p:cNvPr id="6" name="TextBox 5"/>
+          <p:cNvSpPr txBox="1"/>
+          <p:nvPr/>
+        </p:nvSpPr>
+        <p:spPr>
+          <a:xfrm>
+            <a:off x="970454" y="994820"/>
+            <a:ext cx="4842341" cy="369332"/>
+          </a:xfrm>
+          <a:prstGeom prst="rect">
+            <a:avLst/>
+          </a:prstGeom>
+          <a:noFill/>
+        </p:spPr>
+        <p:txBody>
+          <a:bodyPr wrap="none" rtlCol="0">
+            <a:spAutoFit/>
+          </a:bodyPr>
+          <a:lstStyle/>
+          <a:p>
+            <a:r>
+              <a:rPr lang="en-US" dirty="0" smtClean="0"/>
+              <a:t>Exploration of correlations </a:t>
+            </a:r>
+            <a:r>
+              <a:rPr lang="en-US" dirty="0"/>
+              <a:t>between </a:t>
+            </a:r>
+            <a:r>
+              <a:rPr lang="en-US" dirty="0" smtClean="0"/>
+              <a:t>variables</a:t>
+            </a:r>
+            <a:endParaRPr lang="en-US" dirty="0"/>
+          </a:p>
+        </p:txBody>
+      </p:sp>
     </p:spTree>
     <p:extLst>
       <p:ext uri="{BB962C8B-B14F-4D97-AF65-F5344CB8AC3E}">
@@ -9824,6 +10031,13 @@
   <p:clrMapOvr>
     <a:masterClrMapping/>
   </p:clrMapOvr>
+  <p:timing>
+    <p:tnLst>
+      <p:par>
+        <p:cTn xmlns:p14="http://schemas.microsoft.com/office/powerpoint/2010/main" id="1" dur="indefinite" restart="never" nodeType="tmRoot"/>
+      </p:par>
+    </p:tnLst>
+  </p:timing>
 </p:sld>
 </file>
 
@@ -9957,7 +10171,6 @@
               <a:rPr lang="en-US" dirty="0"/>
               <a:t>, so does the incidence of penalties - likely from ruck infringements/penalties.  </a:t>
             </a:r>
-            <a:endParaRPr lang="en-US" dirty="0"/>
           </a:p>
           <a:p>
             <a:pPr marL="45720" indent="0">
@@ -10089,6 +10302,13 @@
   <p:clrMapOvr>
     <a:masterClrMapping/>
   </p:clrMapOvr>
+  <p:timing>
+    <p:tnLst>
+      <p:par>
+        <p:cTn xmlns:p14="http://schemas.microsoft.com/office/powerpoint/2010/main" id="1" dur="indefinite" restart="never" nodeType="tmRoot"/>
+      </p:par>
+    </p:tnLst>
+  </p:timing>
 </p:sld>
 </file>
 

</xml_diff>